<commit_message>
Updated the presentation with the promo code.
</commit_message>
<xml_diff>
--- a/SlideDeck/AutomatedTesting_ObstaclesPitfallsDangers.pptx
+++ b/SlideDeck/AutomatedTesting_ObstaclesPitfallsDangers.pptx
@@ -5,10 +5,10 @@
     <p:sldMasterId id="2147483649" r:id="rId5"/>
   </p:sldMasterIdLst>
   <p:notesMasterIdLst>
-    <p:notesMasterId r:id="rId44"/>
+    <p:notesMasterId r:id="rId45"/>
   </p:notesMasterIdLst>
   <p:handoutMasterIdLst>
-    <p:handoutMasterId r:id="rId45"/>
+    <p:handoutMasterId r:id="rId46"/>
   </p:handoutMasterIdLst>
   <p:sldIdLst>
     <p:sldId id="784" r:id="rId6"/>
@@ -49,6 +49,7 @@
     <p:sldId id="850" r:id="rId41"/>
     <p:sldId id="824" r:id="rId42"/>
     <p:sldId id="825" r:id="rId43"/>
+    <p:sldId id="851" r:id="rId44"/>
   </p:sldIdLst>
   <p:sldSz cx="9144000" cy="6858000" type="screen4x3"/>
   <p:notesSz cx="6858000" cy="9144000"/>
@@ -269,7 +270,7 @@
             <a:fld id="{EA6D1A69-4642-440C-B4DA-A3DDEA39507F}" type="datetimeFigureOut">
               <a:rPr lang="en-US" smtClean="0"/>
               <a:pPr/>
-              <a:t>9/3/2012</a:t>
+              <a:t>9/6/2012</a:t>
             </a:fld>
             <a:endParaRPr lang="en-US"/>
           </a:p>
@@ -4276,11 +4277,7 @@
           <a:p>
             <a:r>
               <a:rPr lang="en-US" dirty="0" smtClean="0"/>
-              <a:t>Automated </a:t>
-            </a:r>
-            <a:r>
-              <a:rPr lang="en-US" dirty="0" smtClean="0"/>
-              <a:t>Testing: Vocabulary</a:t>
+              <a:t>Automated Testing: Vocabulary</a:t>
             </a:r>
             <a:endParaRPr lang="en-US" dirty="0"/>
           </a:p>
@@ -4303,13 +4300,8 @@
           <a:p>
             <a:r>
               <a:rPr lang="en-US" dirty="0" smtClean="0"/>
-              <a:t>Test-Driven </a:t>
-            </a:r>
-            <a:r>
-              <a:rPr lang="en-US" dirty="0" smtClean="0"/>
-              <a:t>Development (TDD)</a:t>
-            </a:r>
-            <a:endParaRPr lang="en-US" dirty="0" smtClean="0"/>
+              <a:t>Test-Driven Development (TDD)</a:t>
+            </a:r>
           </a:p>
           <a:p>
             <a:pPr lvl="1"/>
@@ -4339,13 +4331,8 @@
           <a:p>
             <a:r>
               <a:rPr lang="en-US" dirty="0" smtClean="0"/>
-              <a:t>Behavior-Driven </a:t>
-            </a:r>
-            <a:r>
-              <a:rPr lang="en-US" dirty="0" smtClean="0"/>
-              <a:t>Development (BDD)</a:t>
-            </a:r>
-            <a:endParaRPr lang="en-US" dirty="0" smtClean="0"/>
+              <a:t>Behavior-Driven Development (BDD)</a:t>
+            </a:r>
           </a:p>
           <a:p>
             <a:pPr lvl="1"/>
@@ -5338,14 +5325,12 @@
               <a:rPr lang="en-US" dirty="0" smtClean="0"/>
               <a:t>Short, Clear</a:t>
             </a:r>
-            <a:endParaRPr lang="en-US" dirty="0" smtClean="0"/>
           </a:p>
           <a:p>
             <a:r>
               <a:rPr lang="en-US" dirty="0" smtClean="0"/>
               <a:t>Maintainability</a:t>
             </a:r>
-            <a:endParaRPr lang="en-US" dirty="0" smtClean="0"/>
           </a:p>
           <a:p>
             <a:pPr lvl="1"/>
@@ -6499,7 +6484,6 @@
               <a:rPr lang="en-US" dirty="0"/>
               <a:t>Four Ways to Fake Time</a:t>
             </a:r>
-            <a:endParaRPr lang="en-US" dirty="0"/>
           </a:p>
         </p:txBody>
       </p:sp>
@@ -7343,11 +7327,7 @@
             </a:r>
             <a:r>
               <a:rPr lang="en-US" u="sng" dirty="0" smtClean="0"/>
-              <a:t>data </a:t>
-            </a:r>
-            <a:r>
-              <a:rPr lang="en-US" u="sng" dirty="0" smtClean="0"/>
-              <a:t>keeps </a:t>
+              <a:t>data keeps </a:t>
             </a:r>
             <a:r>
               <a:rPr lang="en-US" u="sng" dirty="0"/>
@@ -8160,7 +8140,6 @@
               <a:rPr lang="en-US" dirty="0"/>
               <a:t>In Test Code, Do Repeat Yourself ... Do Repeat Yourself</a:t>
             </a:r>
-            <a:endParaRPr lang="en-US" dirty="0"/>
           </a:p>
         </p:txBody>
       </p:sp>
@@ -8241,8 +8220,16 @@
                 <a:ea typeface="Verdana" pitchFamily="34" charset="0"/>
                 <a:cs typeface="Verdana" pitchFamily="34" charset="0"/>
               </a:rPr>
-              <a:t>Repetition</a:t>
-            </a:r>
+              <a:t>Reuse</a:t>
+            </a:r>
+            <a:endParaRPr lang="en-US" sz="6000" dirty="0" smtClean="0">
+              <a:solidFill>
+                <a:srgbClr val="C00000"/>
+              </a:solidFill>
+              <a:latin typeface="Verdana" pitchFamily="34" charset="0"/>
+              <a:ea typeface="Verdana" pitchFamily="34" charset="0"/>
+              <a:cs typeface="Verdana" pitchFamily="34" charset="0"/>
+            </a:endParaRPr>
           </a:p>
           <a:p>
             <a:r>
@@ -8254,8 +8241,16 @@
                 <a:ea typeface="Verdana" pitchFamily="34" charset="0"/>
                 <a:cs typeface="Verdana" pitchFamily="34" charset="0"/>
               </a:rPr>
-              <a:t>Reuse</a:t>
-            </a:r>
+              <a:t>Repetition</a:t>
+            </a:r>
+            <a:endParaRPr lang="en-US" sz="6000" dirty="0" smtClean="0">
+              <a:solidFill>
+                <a:srgbClr val="C00000"/>
+              </a:solidFill>
+              <a:latin typeface="Verdana" pitchFamily="34" charset="0"/>
+              <a:ea typeface="Verdana" pitchFamily="34" charset="0"/>
+              <a:cs typeface="Verdana" pitchFamily="34" charset="0"/>
+            </a:endParaRPr>
           </a:p>
           <a:p>
             <a:r>
@@ -8515,11 +8510,7 @@
           <a:p>
             <a:r>
               <a:rPr lang="en-US" dirty="0" smtClean="0"/>
-              <a:t>Data-Drive </a:t>
-            </a:r>
-            <a:r>
-              <a:rPr lang="en-US" dirty="0" smtClean="0"/>
-              <a:t>Test Cases</a:t>
+              <a:t>Data-Drive Test Cases</a:t>
             </a:r>
           </a:p>
           <a:p>
@@ -8539,11 +8530,7 @@
           <a:p>
             <a:r>
               <a:rPr lang="en-US" dirty="0" smtClean="0"/>
-              <a:t>Repeat </a:t>
-            </a:r>
-            <a:r>
-              <a:rPr lang="en-US" dirty="0" smtClean="0"/>
-              <a:t>Code in a “</a:t>
+              <a:t>Repeat Code in a “</a:t>
             </a:r>
             <a:r>
               <a:rPr lang="en-US" dirty="0" err="1" smtClean="0"/>
@@ -8586,7 +8573,6 @@
               <a:rPr lang="en-US" dirty="0" smtClean="0"/>
               <a:t>Keep Inheritance in Reserve</a:t>
             </a:r>
-            <a:endParaRPr lang="en-US" dirty="0" smtClean="0"/>
           </a:p>
           <a:p>
             <a:pPr lvl="1"/>
@@ -9615,7 +9601,7 @@
           <a:p>
             <a:r>
               <a:rPr lang="en-US" sz="2800" b="1" dirty="0" smtClean="0"/>
-              <a:t>?</a:t>
+              <a:t>LIN340</a:t>
             </a:r>
             <a:endParaRPr lang="en-US" sz="2800" b="1" dirty="0" smtClean="0"/>
           </a:p>
@@ -9629,7 +9615,11 @@
             </a:r>
             <a:r>
               <a:rPr lang="en-US" dirty="0" smtClean="0"/>
-              <a:t>??-Sep-2012</a:t>
+              <a:t>6</a:t>
+            </a:r>
+            <a:r>
+              <a:rPr lang="en-US" dirty="0" smtClean="0"/>
+              <a:t>-Oct-2012</a:t>
             </a:r>
             <a:endParaRPr lang="en-US" dirty="0"/>
           </a:p>
@@ -9750,6 +9740,120 @@
     <p:extLst>
       <p:ext uri="{BB962C8B-B14F-4D97-AF65-F5344CB8AC3E}">
         <p14:creationId xmlns:p14="http://schemas.microsoft.com/office/powerpoint/2010/main" val="2993598017"/>
+      </p:ext>
+    </p:extLst>
+  </p:cSld>
+  <p:clrMapOvr>
+    <a:masterClrMapping/>
+  </p:clrMapOvr>
+</p:sld>
+</file>
+
+<file path=ppt/slides/slide39.xml><?xml version="1.0" encoding="utf-8"?>
+<p:sld xmlns:a="http://schemas.openxmlformats.org/drawingml/2006/main" xmlns:r="http://schemas.openxmlformats.org/officeDocument/2006/relationships" xmlns:p="http://schemas.openxmlformats.org/presentationml/2006/main">
+  <p:cSld>
+    <p:spTree>
+      <p:nvGrpSpPr>
+        <p:cNvPr id="1" name=""/>
+        <p:cNvGrpSpPr/>
+        <p:nvPr/>
+      </p:nvGrpSpPr>
+      <p:grpSpPr>
+        <a:xfrm>
+          <a:off x="0" y="0"/>
+          <a:ext cx="0" cy="0"/>
+          <a:chOff x="0" y="0"/>
+          <a:chExt cx="0" cy="0"/>
+        </a:xfrm>
+      </p:grpSpPr>
+      <p:sp>
+        <p:nvSpPr>
+          <p:cNvPr id="2" name="Title 1"/>
+          <p:cNvSpPr>
+            <a:spLocks noGrp="1"/>
+          </p:cNvSpPr>
+          <p:nvPr>
+            <p:ph type="title"/>
+          </p:nvPr>
+        </p:nvSpPr>
+        <p:spPr/>
+        <p:txBody>
+          <a:bodyPr/>
+          <a:lstStyle/>
+          <a:p>
+            <a:r>
+              <a:rPr lang="en-US" dirty="0" smtClean="0"/>
+              <a:t>Slides and Examples</a:t>
+            </a:r>
+            <a:endParaRPr lang="en-US" dirty="0"/>
+          </a:p>
+        </p:txBody>
+      </p:sp>
+      <p:sp>
+        <p:nvSpPr>
+          <p:cNvPr id="3" name="Content Placeholder 2"/>
+          <p:cNvSpPr>
+            <a:spLocks noGrp="1"/>
+          </p:cNvSpPr>
+          <p:nvPr>
+            <p:ph idx="1"/>
+          </p:nvPr>
+        </p:nvSpPr>
+        <p:spPr/>
+        <p:txBody>
+          <a:bodyPr/>
+          <a:lstStyle/>
+          <a:p>
+            <a:r>
+              <a:rPr lang="en-US" dirty="0" err="1" smtClean="0"/>
+              <a:t>Slideshare</a:t>
+            </a:r>
+            <a:r>
+              <a:rPr lang="en-US" dirty="0" smtClean="0"/>
+              <a:t>:</a:t>
+            </a:r>
+            <a:r>
+              <a:rPr lang="en-US" dirty="0" smtClean="0"/>
+              <a:t>	</a:t>
+            </a:r>
+            <a:r>
+              <a:rPr lang="en-US" dirty="0"/>
+              <a:t>http://www.slideshare.net/ruthlesshelp</a:t>
+            </a:r>
+            <a:endParaRPr lang="en-US" dirty="0" smtClean="0"/>
+          </a:p>
+          <a:p>
+            <a:endParaRPr lang="en-US" dirty="0" smtClean="0"/>
+          </a:p>
+          <a:p>
+            <a:r>
+              <a:rPr lang="en-US" dirty="0" err="1" smtClean="0"/>
+              <a:t>Github</a:t>
+            </a:r>
+            <a:r>
+              <a:rPr lang="en-US" dirty="0" smtClean="0"/>
+              <a:t>:</a:t>
+            </a:r>
+            <a:r>
+              <a:rPr lang="en-US" dirty="0" smtClean="0"/>
+              <a:t>	</a:t>
+            </a:r>
+            <a:r>
+              <a:rPr lang="en-US" dirty="0" smtClean="0"/>
+              <a:t>http://</a:t>
+            </a:r>
+            <a:r>
+              <a:rPr lang="en-US" dirty="0"/>
+              <a:t>github.com/ruthlesshelp</a:t>
+            </a:r>
+            <a:endParaRPr lang="en-US" dirty="0" smtClean="0"/>
+          </a:p>
+        </p:txBody>
+      </p:sp>
+    </p:spTree>
+    <p:extLst>
+      <p:ext uri="{BB962C8B-B14F-4D97-AF65-F5344CB8AC3E}">
+        <p14:creationId xmlns:p14="http://schemas.microsoft.com/office/powerpoint/2010/main" val="3507615272"/>
       </p:ext>
     </p:extLst>
   </p:cSld>
@@ -12339,12 +12443,7 @@
 </file>
 
 <file path=customXml/item1.xml><?xml version="1.0" encoding="utf-8"?>
-<?mso-contentType ?>
-<FormTemplates xmlns="http://schemas.microsoft.com/sharepoint/v3/contenttype/forms">
-  <Display>DocumentLibraryForm</Display>
-  <Edit>DocumentLibraryForm</Edit>
-  <New>DocumentLibraryForm</New>
-</FormTemplates>
+<LongProperties xmlns="http://schemas.microsoft.com/office/2006/metadata/longProperties"/>
 </file>
 
 <file path=customXml/item2.xml><?xml version="1.0" encoding="utf-8"?>
@@ -12354,7 +12453,12 @@
 </file>
 
 <file path=customXml/item3.xml><?xml version="1.0" encoding="utf-8"?>
-<LongProperties xmlns="http://schemas.microsoft.com/office/2006/metadata/longProperties"/>
+<?mso-contentType ?>
+<FormTemplates xmlns="http://schemas.microsoft.com/sharepoint/v3/contenttype/forms">
+  <Display>DocumentLibraryForm</Display>
+  <Edit>DocumentLibraryForm</Edit>
+  <New>DocumentLibraryForm</New>
+</FormTemplates>
 </file>
 
 <file path=customXml/item4.xml><?xml version="1.0" encoding="utf-8"?>
@@ -12407,9 +12511,9 @@
 </file>
 
 <file path=customXml/itemProps1.xml><?xml version="1.0" encoding="utf-8"?>
-<ds:datastoreItem xmlns:ds="http://schemas.openxmlformats.org/officeDocument/2006/customXml" ds:itemID="{6B6AE0AA-FA39-478D-9CD3-6A3092A1C572}">
+<ds:datastoreItem xmlns:ds="http://schemas.openxmlformats.org/officeDocument/2006/customXml" ds:itemID="{C13986F2-2813-470E-828A-8D5702178ABB}">
   <ds:schemaRefs>
-    <ds:schemaRef ds:uri="http://schemas.microsoft.com/sharepoint/v3/contenttype/forms"/>
+    <ds:schemaRef ds:uri="http://schemas.microsoft.com/office/2006/metadata/longProperties"/>
   </ds:schemaRefs>
 </ds:datastoreItem>
 </file>
@@ -12429,9 +12533,9 @@
 </file>
 
 <file path=customXml/itemProps3.xml><?xml version="1.0" encoding="utf-8"?>
-<ds:datastoreItem xmlns:ds="http://schemas.openxmlformats.org/officeDocument/2006/customXml" ds:itemID="{C13986F2-2813-470E-828A-8D5702178ABB}">
+<ds:datastoreItem xmlns:ds="http://schemas.openxmlformats.org/officeDocument/2006/customXml" ds:itemID="{6B6AE0AA-FA39-478D-9CD3-6A3092A1C572}">
   <ds:schemaRefs>
-    <ds:schemaRef ds:uri="http://schemas.microsoft.com/office/2006/metadata/longProperties"/>
+    <ds:schemaRef ds:uri="http://schemas.microsoft.com/sharepoint/v3/contenttype/forms"/>
   </ds:schemaRefs>
 </ds:datastoreItem>
 </file>

</xml_diff>